<commit_message>
Agrego pivotal tracker y un diagramita asi nomas de la App a la presentación Tecnica
</commit_message>
<xml_diff>
--- a/presentaciones/Tecnica.pptx
+++ b/presentaciones/Tecnica.pptx
@@ -16,8 +16,9 @@
     <p:sldId id="262" r:id="rId10"/>
     <p:sldId id="263" r:id="rId11"/>
     <p:sldId id="265" r:id="rId12"/>
-    <p:sldId id="264" r:id="rId13"/>
-    <p:sldId id="267" r:id="rId14"/>
+    <p:sldId id="269" r:id="rId13"/>
+    <p:sldId id="264" r:id="rId14"/>
+    <p:sldId id="267" r:id="rId15"/>
   </p:sldIdLst>
   <p:sldSz cx="9144000" cy="6858000" type="screen4x3"/>
   <p:notesSz cx="6858000" cy="9144000"/>
@@ -547,7 +548,7 @@
             <a:fld id="{2AA957AF-53C0-420B-9C2D-77DB1416566C}" type="slidenum">
               <a:rPr kumimoji="0" lang="en-US" smtClean="0"/>
               <a:pPr/>
-              <a:t>‹Nº›</a:t>
+              <a:t>‹#›</a:t>
             </a:fld>
             <a:endParaRPr kumimoji="0" lang="en-US"/>
           </a:p>
@@ -714,7 +715,7 @@
             <a:fld id="{2AA957AF-53C0-420B-9C2D-77DB1416566C}" type="slidenum">
               <a:rPr kumimoji="0" lang="en-US" smtClean="0"/>
               <a:pPr/>
-              <a:t>‹Nº›</a:t>
+              <a:t>‹#›</a:t>
             </a:fld>
             <a:endParaRPr kumimoji="0" lang="en-US"/>
           </a:p>
@@ -891,7 +892,7 @@
             <a:fld id="{2AA957AF-53C0-420B-9C2D-77DB1416566C}" type="slidenum">
               <a:rPr kumimoji="0" lang="en-US" smtClean="0"/>
               <a:pPr/>
-              <a:t>‹Nº›</a:t>
+              <a:t>‹#›</a:t>
             </a:fld>
             <a:endParaRPr kumimoji="0" lang="en-US"/>
           </a:p>
@@ -1063,7 +1064,7 @@
             <a:fld id="{2AA957AF-53C0-420B-9C2D-77DB1416566C}" type="slidenum">
               <a:rPr kumimoji="0" lang="en-US" smtClean="0"/>
               <a:pPr/>
-              <a:t>‹Nº›</a:t>
+              <a:t>‹#›</a:t>
             </a:fld>
             <a:endParaRPr kumimoji="0" lang="en-US"/>
           </a:p>
@@ -1544,7 +1545,7 @@
             <a:fld id="{2AA957AF-53C0-420B-9C2D-77DB1416566C}" type="slidenum">
               <a:rPr kumimoji="0" lang="en-US" smtClean="0"/>
               <a:pPr/>
-              <a:t>‹Nº›</a:t>
+              <a:t>‹#›</a:t>
             </a:fld>
             <a:endParaRPr kumimoji="0" lang="en-US"/>
           </a:p>
@@ -1810,7 +1811,7 @@
             <a:fld id="{2AA957AF-53C0-420B-9C2D-77DB1416566C}" type="slidenum">
               <a:rPr kumimoji="0" lang="en-US" smtClean="0"/>
               <a:pPr/>
-              <a:t>‹Nº›</a:t>
+              <a:t>‹#›</a:t>
             </a:fld>
             <a:endParaRPr kumimoji="0" lang="en-US"/>
           </a:p>
@@ -2186,7 +2187,7 @@
             <a:fld id="{2AA957AF-53C0-420B-9C2D-77DB1416566C}" type="slidenum">
               <a:rPr kumimoji="0" lang="en-US" smtClean="0"/>
               <a:pPr/>
-              <a:t>‹Nº›</a:t>
+              <a:t>‹#›</a:t>
             </a:fld>
             <a:endParaRPr kumimoji="0" lang="en-US"/>
           </a:p>
@@ -2291,7 +2292,7 @@
             <a:fld id="{2AA957AF-53C0-420B-9C2D-77DB1416566C}" type="slidenum">
               <a:rPr kumimoji="0" lang="en-US" smtClean="0"/>
               <a:pPr/>
-              <a:t>‹Nº›</a:t>
+              <a:t>‹#›</a:t>
             </a:fld>
             <a:endParaRPr kumimoji="0" lang="en-US"/>
           </a:p>
@@ -2402,7 +2403,7 @@
             <a:fld id="{2AA957AF-53C0-420B-9C2D-77DB1416566C}" type="slidenum">
               <a:rPr kumimoji="0" lang="en-US" smtClean="0"/>
               <a:pPr/>
-              <a:t>‹Nº›</a:t>
+              <a:t>‹#›</a:t>
             </a:fld>
             <a:endParaRPr kumimoji="0" lang="en-US"/>
           </a:p>
@@ -2658,7 +2659,7 @@
             <a:fld id="{2AA957AF-53C0-420B-9C2D-77DB1416566C}" type="slidenum">
               <a:rPr kumimoji="0" lang="en-US" smtClean="0"/>
               <a:pPr/>
-              <a:t>‹Nº›</a:t>
+              <a:t>‹#›</a:t>
             </a:fld>
             <a:endParaRPr kumimoji="0" lang="en-US"/>
           </a:p>
@@ -2914,7 +2915,7 @@
             <a:fld id="{2AA957AF-53C0-420B-9C2D-77DB1416566C}" type="slidenum">
               <a:rPr kumimoji="0" lang="en-US" smtClean="0"/>
               <a:pPr/>
-              <a:t>‹Nº›</a:t>
+              <a:t>‹#›</a:t>
             </a:fld>
             <a:endParaRPr kumimoji="0" lang="en-US"/>
           </a:p>
@@ -3369,7 +3370,7 @@
             <a:fld id="{2AA957AF-53C0-420B-9C2D-77DB1416566C}" type="slidenum">
               <a:rPr kumimoji="0" lang="en-US" smtClean="0"/>
               <a:pPr/>
-              <a:t>‹Nº›</a:t>
+              <a:t>‹#›</a:t>
             </a:fld>
             <a:endParaRPr kumimoji="0" lang="en-US" sz="1000" dirty="0">
               <a:solidFill>
@@ -3871,11 +3872,7 @@
           <a:p>
             <a:r>
               <a:rPr lang="es-AR" dirty="0" smtClean="0"/>
-              <a:t>Independencia de </a:t>
-            </a:r>
-            <a:r>
-              <a:rPr lang="es-AR" dirty="0" smtClean="0"/>
-              <a:t>BD</a:t>
+              <a:t>Independencia de BD</a:t>
             </a:r>
           </a:p>
           <a:p>
@@ -3883,7 +3880,6 @@
               <a:rPr lang="es-AR" dirty="0" smtClean="0"/>
               <a:t>Simple y robusta</a:t>
             </a:r>
-            <a:endParaRPr lang="es-AR" dirty="0" smtClean="0"/>
           </a:p>
           <a:p>
             <a:endParaRPr lang="es-AR" dirty="0"/>
@@ -3955,7 +3951,6 @@
               <a:rPr lang="es-AR" sz="3000" dirty="0" smtClean="0"/>
               <a:t>Cliente</a:t>
             </a:r>
-            <a:endParaRPr lang="es-AR" sz="3000" dirty="0" smtClean="0"/>
           </a:p>
         </p:txBody>
       </p:sp>
@@ -4024,7 +4019,6 @@
               <a:rPr lang="es-AR" sz="3000" dirty="0" smtClean="0"/>
               <a:t>Servidor</a:t>
             </a:r>
-            <a:endParaRPr lang="es-AR" sz="3000" dirty="0" smtClean="0"/>
           </a:p>
         </p:txBody>
       </p:sp>
@@ -4076,8 +4070,8 @@
           <a:lstStyle/>
           <a:p>
             <a:r>
-              <a:rPr lang="es-AR" dirty="0" err="1" smtClean="0"/>
-              <a:t>Grails</a:t>
+              <a:rPr lang="es-AR" dirty="0" smtClean="0"/>
+              <a:t>Desarrollo</a:t>
             </a:r>
             <a:endParaRPr lang="es-AR" dirty="0"/>
           </a:p>
@@ -4257,6 +4251,40 @@
           </a:prstGeom>
         </p:spPr>
       </p:pic>
+      <p:sp>
+        <p:nvSpPr>
+          <p:cNvPr id="9" name="TextBox 8"/>
+          <p:cNvSpPr txBox="1"/>
+          <p:nvPr/>
+        </p:nvSpPr>
+        <p:spPr>
+          <a:xfrm>
+            <a:off x="7072330" y="1214422"/>
+            <a:ext cx="1643074" cy="400110"/>
+          </a:xfrm>
+          <a:prstGeom prst="rect">
+            <a:avLst/>
+          </a:prstGeom>
+          <a:noFill/>
+        </p:spPr>
+        <p:txBody>
+          <a:bodyPr wrap="square" rtlCol="0">
+            <a:spAutoFit/>
+          </a:bodyPr>
+          <a:lstStyle/>
+          <a:p>
+            <a:r>
+              <a:rPr lang="es-ES" sz="2000" dirty="0" err="1" smtClean="0">
+                <a:latin typeface="+mj-lt"/>
+              </a:rPr>
+              <a:t>Grails</a:t>
+            </a:r>
+            <a:endParaRPr lang="es-ES" sz="2000" dirty="0">
+              <a:latin typeface="+mj-lt"/>
+            </a:endParaRPr>
+          </a:p>
+        </p:txBody>
+      </p:sp>
     </p:spTree>
   </p:cSld>
   <p:clrMapOvr>
@@ -4291,132 +4319,146 @@
       </p:grpSpPr>
       <p:sp>
         <p:nvSpPr>
-          <p:cNvPr id="2" name="1 Título"/>
-          <p:cNvSpPr>
-            <a:spLocks noGrp="1"/>
-          </p:cNvSpPr>
-          <p:nvPr>
-            <p:ph type="title"/>
-          </p:nvPr>
-        </p:nvSpPr>
-        <p:spPr/>
-        <p:txBody>
-          <a:bodyPr/>
-          <a:lstStyle/>
-          <a:p>
-            <a:r>
-              <a:rPr lang="es-AR" dirty="0" smtClean="0"/>
-              <a:t>Mejoras</a:t>
-            </a:r>
-            <a:endParaRPr lang="es-AR" dirty="0"/>
-          </a:p>
-        </p:txBody>
-      </p:sp>
-      <p:sp>
-        <p:nvSpPr>
-          <p:cNvPr id="3" name="2 Marcador de contenido"/>
-          <p:cNvSpPr>
-            <a:spLocks noGrp="1"/>
-          </p:cNvSpPr>
-          <p:nvPr>
-            <p:ph idx="1"/>
-          </p:nvPr>
-        </p:nvSpPr>
-        <p:spPr/>
-        <p:txBody>
-          <a:bodyPr/>
-          <a:lstStyle/>
-          <a:p>
-            <a:r>
-              <a:rPr lang="es-AR" dirty="0" smtClean="0"/>
-              <a:t>Integración con otras redes sociales</a:t>
-            </a:r>
-          </a:p>
-          <a:p>
-            <a:r>
-              <a:rPr lang="es-AR" dirty="0" smtClean="0"/>
-              <a:t>Integración con</a:t>
-            </a:r>
-          </a:p>
-          <a:p>
-            <a:r>
-              <a:rPr lang="es-AR" dirty="0" smtClean="0"/>
-              <a:t>Extensión a dispositivos móviles</a:t>
-            </a:r>
-          </a:p>
-          <a:p>
-            <a:endParaRPr lang="es-AR" dirty="0" smtClean="0"/>
-          </a:p>
-          <a:p>
-            <a:r>
-              <a:rPr lang="es-AR" dirty="0" smtClean="0"/>
-              <a:t>Reserva de canchas vía web</a:t>
-            </a:r>
-          </a:p>
-          <a:p>
-            <a:r>
-              <a:rPr lang="es-AR" dirty="0" smtClean="0"/>
-              <a:t>Consultar disponibilidad en los establecimientos deportivos</a:t>
-            </a:r>
-          </a:p>
-          <a:p>
-            <a:endParaRPr lang="es-AR" dirty="0" smtClean="0"/>
-          </a:p>
-          <a:p>
-            <a:endParaRPr lang="es-AR" dirty="0"/>
+          <p:cNvPr id="4" name="1 Título"/>
+          <p:cNvSpPr txBox="1">
+            <a:spLocks/>
+          </p:cNvSpPr>
+          <p:nvPr/>
+        </p:nvSpPr>
+        <p:spPr>
+          <a:xfrm>
+            <a:off x="2786050" y="285728"/>
+            <a:ext cx="5112568" cy="1138138"/>
+          </a:xfrm>
+          <a:prstGeom prst="rect">
+            <a:avLst/>
+          </a:prstGeom>
+        </p:spPr>
+        <p:txBody>
+          <a:bodyPr vert="horz" lIns="45720" rIns="45720" anchor="ctr">
+            <a:normAutofit/>
+          </a:bodyPr>
+          <a:lstStyle/>
+          <a:p>
+            <a:pPr marL="0" marR="0" lvl="0" indent="0" algn="r" defTabSz="914400" rtl="0" eaLnBrk="1" fontAlgn="auto" latinLnBrk="0" hangingPunct="1">
+              <a:lnSpc>
+                <a:spcPct val="100000"/>
+              </a:lnSpc>
+              <a:spcBef>
+                <a:spcPct val="0"/>
+              </a:spcBef>
+              <a:spcAft>
+                <a:spcPts val="0"/>
+              </a:spcAft>
+              <a:buClrTx/>
+              <a:buSzTx/>
+              <a:buFontTx/>
+              <a:buNone/>
+              <a:tabLst/>
+              <a:defRPr/>
+            </a:pPr>
+            <a:r>
+              <a:rPr kumimoji="0" lang="es-AR" sz="4600" b="0" i="0" u="none" strike="noStrike" kern="1200" cap="none" spc="0" normalizeH="0" baseline="0" noProof="0" smtClean="0">
+                <a:ln>
+                  <a:noFill/>
+                </a:ln>
+                <a:solidFill>
+                  <a:schemeClr val="tx1"/>
+                </a:solidFill>
+                <a:effectLst/>
+                <a:uLnTx/>
+                <a:uFillTx/>
+                <a:latin typeface="+mj-lt"/>
+                <a:ea typeface="+mj-ea"/>
+                <a:cs typeface="+mj-cs"/>
+              </a:rPr>
+              <a:t>Desarrollo</a:t>
+            </a:r>
+            <a:endParaRPr kumimoji="0" lang="es-AR" sz="4600" b="0" i="0" u="none" strike="noStrike" kern="1200" cap="none" spc="0" normalizeH="0" baseline="0" noProof="0" dirty="0">
+              <a:ln>
+                <a:noFill/>
+              </a:ln>
+              <a:solidFill>
+                <a:schemeClr val="tx1"/>
+              </a:solidFill>
+              <a:effectLst/>
+              <a:uLnTx/>
+              <a:uFillTx/>
+              <a:latin typeface="+mj-lt"/>
+              <a:ea typeface="+mj-ea"/>
+              <a:cs typeface="+mj-cs"/>
+            </a:endParaRPr>
+          </a:p>
+        </p:txBody>
+      </p:sp>
+      <p:sp>
+        <p:nvSpPr>
+          <p:cNvPr id="5" name="TextBox 4"/>
+          <p:cNvSpPr txBox="1"/>
+          <p:nvPr/>
+        </p:nvSpPr>
+        <p:spPr>
+          <a:xfrm>
+            <a:off x="6215042" y="1214422"/>
+            <a:ext cx="2928958" cy="400110"/>
+          </a:xfrm>
+          <a:prstGeom prst="rect">
+            <a:avLst/>
+          </a:prstGeom>
+          <a:noFill/>
+        </p:spPr>
+        <p:txBody>
+          <a:bodyPr wrap="square" rtlCol="0">
+            <a:spAutoFit/>
+          </a:bodyPr>
+          <a:lstStyle/>
+          <a:p>
+            <a:r>
+              <a:rPr lang="es-ES" sz="2000" dirty="0" err="1" smtClean="0">
+                <a:latin typeface="+mj-lt"/>
+              </a:rPr>
+              <a:t>Pivotal</a:t>
+            </a:r>
+            <a:r>
+              <a:rPr lang="es-ES" sz="2000" dirty="0" smtClean="0">
+                <a:latin typeface="+mj-lt"/>
+              </a:rPr>
+              <a:t> </a:t>
+            </a:r>
+            <a:r>
+              <a:rPr lang="es-ES" sz="2000" dirty="0" err="1" smtClean="0">
+                <a:latin typeface="+mj-lt"/>
+              </a:rPr>
+              <a:t>Tracker</a:t>
+            </a:r>
+            <a:endParaRPr lang="es-ES" sz="2000" dirty="0" smtClean="0">
+              <a:latin typeface="+mj-lt"/>
+            </a:endParaRPr>
           </a:p>
         </p:txBody>
       </p:sp>
       <p:pic>
         <p:nvPicPr>
-          <p:cNvPr id="21506" name="Picture 2" descr="http://www.readwriteweb.es/wp-content/uploads/2010/01/Logo-twitter.png"/>
+          <p:cNvPr id="6" name="Picture 5" descr="tracker.png"/>
           <p:cNvPicPr>
-            <a:picLocks noChangeAspect="1" noChangeArrowheads="1"/>
+            <a:picLocks noChangeAspect="1"/>
           </p:cNvPicPr>
           <p:nvPr/>
         </p:nvPicPr>
         <p:blipFill>
-          <a:blip r:embed="rId2" cstate="print"/>
-          <a:srcRect/>
+          <a:blip r:embed="rId2"/>
           <a:stretch>
             <a:fillRect/>
           </a:stretch>
         </p:blipFill>
-        <p:spPr bwMode="auto">
-          <a:xfrm>
-            <a:off x="7092280" y="1556792"/>
-            <a:ext cx="494184" cy="494184"/>
+        <p:spPr>
+          <a:xfrm>
+            <a:off x="285720" y="1785926"/>
+            <a:ext cx="8501090" cy="4779530"/>
           </a:xfrm>
           <a:prstGeom prst="rect">
             <a:avLst/>
           </a:prstGeom>
-          <a:noFill/>
-        </p:spPr>
-      </p:pic>
-      <p:pic>
-        <p:nvPicPr>
-          <p:cNvPr id="21512" name="Picture 8" descr="http://upload.wikimedia.org/wikipedia/commons/9/9a/Google_maps_logo.png"/>
-          <p:cNvPicPr>
-            <a:picLocks noChangeAspect="1" noChangeArrowheads="1"/>
-          </p:cNvPicPr>
-          <p:nvPr/>
-        </p:nvPicPr>
-        <p:blipFill>
-          <a:blip r:embed="rId3" cstate="print"/>
-          <a:srcRect/>
-          <a:stretch>
-            <a:fillRect/>
-          </a:stretch>
-        </p:blipFill>
-        <p:spPr bwMode="auto">
-          <a:xfrm>
-            <a:off x="3707904" y="2276872"/>
-            <a:ext cx="1647149" cy="341997"/>
-          </a:xfrm>
-          <a:prstGeom prst="rect">
-            <a:avLst/>
-          </a:prstGeom>
-          <a:noFill/>
         </p:spPr>
       </p:pic>
     </p:spTree>
@@ -4468,6 +4510,168 @@
           <a:p>
             <a:r>
               <a:rPr lang="es-AR" dirty="0" smtClean="0"/>
+              <a:t>Mejoras</a:t>
+            </a:r>
+            <a:endParaRPr lang="es-AR" dirty="0"/>
+          </a:p>
+        </p:txBody>
+      </p:sp>
+      <p:sp>
+        <p:nvSpPr>
+          <p:cNvPr id="3" name="2 Marcador de contenido"/>
+          <p:cNvSpPr>
+            <a:spLocks noGrp="1"/>
+          </p:cNvSpPr>
+          <p:nvPr>
+            <p:ph idx="1"/>
+          </p:nvPr>
+        </p:nvSpPr>
+        <p:spPr/>
+        <p:txBody>
+          <a:bodyPr/>
+          <a:lstStyle/>
+          <a:p>
+            <a:r>
+              <a:rPr lang="es-AR" dirty="0" smtClean="0"/>
+              <a:t>Integración con otras redes sociales</a:t>
+            </a:r>
+          </a:p>
+          <a:p>
+            <a:r>
+              <a:rPr lang="es-AR" dirty="0" smtClean="0"/>
+              <a:t>Integración con</a:t>
+            </a:r>
+          </a:p>
+          <a:p>
+            <a:r>
+              <a:rPr lang="es-AR" dirty="0" smtClean="0"/>
+              <a:t>Extensión a dispositivos móviles</a:t>
+            </a:r>
+          </a:p>
+          <a:p>
+            <a:endParaRPr lang="es-AR" dirty="0" smtClean="0"/>
+          </a:p>
+          <a:p>
+            <a:r>
+              <a:rPr lang="es-AR" dirty="0" smtClean="0"/>
+              <a:t>Reserva de canchas vía web</a:t>
+            </a:r>
+          </a:p>
+          <a:p>
+            <a:r>
+              <a:rPr lang="es-AR" dirty="0" smtClean="0"/>
+              <a:t>Consultar disponibilidad en los establecimientos deportivos</a:t>
+            </a:r>
+          </a:p>
+          <a:p>
+            <a:endParaRPr lang="es-AR" dirty="0" smtClean="0"/>
+          </a:p>
+          <a:p>
+            <a:endParaRPr lang="es-AR" dirty="0"/>
+          </a:p>
+        </p:txBody>
+      </p:sp>
+      <p:pic>
+        <p:nvPicPr>
+          <p:cNvPr id="21506" name="Picture 2" descr="http://www.readwriteweb.es/wp-content/uploads/2010/01/Logo-twitter.png"/>
+          <p:cNvPicPr>
+            <a:picLocks noChangeAspect="1" noChangeArrowheads="1"/>
+          </p:cNvPicPr>
+          <p:nvPr/>
+        </p:nvPicPr>
+        <p:blipFill>
+          <a:blip r:embed="rId2" cstate="print"/>
+          <a:srcRect/>
+          <a:stretch>
+            <a:fillRect/>
+          </a:stretch>
+        </p:blipFill>
+        <p:spPr bwMode="auto">
+          <a:xfrm>
+            <a:off x="7092280" y="1556792"/>
+            <a:ext cx="494184" cy="494184"/>
+          </a:xfrm>
+          <a:prstGeom prst="rect">
+            <a:avLst/>
+          </a:prstGeom>
+          <a:noFill/>
+        </p:spPr>
+      </p:pic>
+      <p:pic>
+        <p:nvPicPr>
+          <p:cNvPr id="21512" name="Picture 8" descr="http://upload.wikimedia.org/wikipedia/commons/9/9a/Google_maps_logo.png"/>
+          <p:cNvPicPr>
+            <a:picLocks noChangeAspect="1" noChangeArrowheads="1"/>
+          </p:cNvPicPr>
+          <p:nvPr/>
+        </p:nvPicPr>
+        <p:blipFill>
+          <a:blip r:embed="rId3" cstate="print"/>
+          <a:srcRect/>
+          <a:stretch>
+            <a:fillRect/>
+          </a:stretch>
+        </p:blipFill>
+        <p:spPr bwMode="auto">
+          <a:xfrm>
+            <a:off x="3707904" y="2276872"/>
+            <a:ext cx="1647149" cy="341997"/>
+          </a:xfrm>
+          <a:prstGeom prst="rect">
+            <a:avLst/>
+          </a:prstGeom>
+          <a:noFill/>
+        </p:spPr>
+      </p:pic>
+    </p:spTree>
+  </p:cSld>
+  <p:clrMapOvr>
+    <a:masterClrMapping/>
+  </p:clrMapOvr>
+  <p:timing>
+    <p:tnLst>
+      <p:par>
+        <p:cTn id="1" dur="indefinite" restart="never" nodeType="tmRoot"/>
+      </p:par>
+    </p:tnLst>
+  </p:timing>
+</p:sld>
+</file>
+
+<file path=ppt/slides/slide14.xml><?xml version="1.0" encoding="utf-8"?>
+<p:sld xmlns:a="http://schemas.openxmlformats.org/drawingml/2006/main" xmlns:r="http://schemas.openxmlformats.org/officeDocument/2006/relationships" xmlns:p="http://schemas.openxmlformats.org/presentationml/2006/main">
+  <p:cSld>
+    <p:spTree>
+      <p:nvGrpSpPr>
+        <p:cNvPr id="1" name=""/>
+        <p:cNvGrpSpPr/>
+        <p:nvPr/>
+      </p:nvGrpSpPr>
+      <p:grpSpPr>
+        <a:xfrm>
+          <a:off x="0" y="0"/>
+          <a:ext cx="0" cy="0"/>
+          <a:chOff x="0" y="0"/>
+          <a:chExt cx="0" cy="0"/>
+        </a:xfrm>
+      </p:grpSpPr>
+      <p:sp>
+        <p:nvSpPr>
+          <p:cNvPr id="2" name="1 Título"/>
+          <p:cNvSpPr>
+            <a:spLocks noGrp="1"/>
+          </p:cNvSpPr>
+          <p:nvPr>
+            <p:ph type="title"/>
+          </p:nvPr>
+        </p:nvSpPr>
+        <p:spPr/>
+        <p:txBody>
+          <a:bodyPr/>
+          <a:lstStyle/>
+          <a:p>
+            <a:r>
+              <a:rPr lang="es-AR" dirty="0" smtClean="0"/>
               <a:t>Preguntas</a:t>
             </a:r>
             <a:endParaRPr lang="es-AR" dirty="0"/>
@@ -4581,7 +4785,12 @@
             <p:ph idx="1"/>
           </p:nvPr>
         </p:nvSpPr>
-        <p:spPr/>
+        <p:spPr>
+          <a:xfrm>
+            <a:off x="500034" y="1928802"/>
+            <a:ext cx="7467600" cy="4525963"/>
+          </a:xfrm>
+        </p:spPr>
         <p:txBody>
           <a:bodyPr/>
           <a:lstStyle/>
@@ -4594,55 +4803,46 @@
           <a:p>
             <a:r>
               <a:rPr lang="es-AR" dirty="0" smtClean="0"/>
-              <a:t>Objetivo </a:t>
-            </a:r>
+              <a:t>Objetivo y Alcance</a:t>
+            </a:r>
+          </a:p>
+          <a:p>
             <a:r>
               <a:rPr lang="es-AR" dirty="0" smtClean="0"/>
-              <a:t>y Alcance</a:t>
+              <a:t>Casos de Uso Principales</a:t>
             </a:r>
           </a:p>
           <a:p>
             <a:r>
               <a:rPr lang="es-AR" dirty="0" smtClean="0"/>
-              <a:t>Casos de Uso </a:t>
+              <a:t>Modelo de </a:t>
             </a:r>
             <a:r>
               <a:rPr lang="es-AR" dirty="0" smtClean="0"/>
-              <a:t>Principales</a:t>
+              <a:t>dominio</a:t>
             </a:r>
           </a:p>
           <a:p>
             <a:r>
               <a:rPr lang="es-AR" dirty="0" smtClean="0"/>
-              <a:t>Modelo de dominio</a:t>
-            </a:r>
+              <a:t>Arquitectura de </a:t>
+            </a:r>
+            <a:r>
+              <a:rPr lang="es-AR" dirty="0" smtClean="0"/>
+              <a:t>software</a:t>
+            </a:r>
+            <a:endParaRPr lang="es-AR" dirty="0" smtClean="0"/>
           </a:p>
           <a:p>
             <a:r>
               <a:rPr lang="es-AR" dirty="0" smtClean="0"/>
               <a:t>Desarrollo de la aplicación</a:t>
             </a:r>
-            <a:endParaRPr lang="es-AR" dirty="0" smtClean="0"/>
-          </a:p>
-          <a:p>
-            <a:r>
-              <a:rPr lang="es-AR" dirty="0" smtClean="0"/>
-              <a:t>Arquitectura de </a:t>
-            </a:r>
-            <a:r>
-              <a:rPr lang="es-AR" dirty="0" smtClean="0"/>
-              <a:t>software</a:t>
-            </a:r>
-            <a:endParaRPr lang="es-AR" dirty="0" smtClean="0"/>
           </a:p>
           <a:p>
             <a:r>
               <a:rPr lang="es-ES" dirty="0" smtClean="0"/>
-              <a:t>Mejoras </a:t>
-            </a:r>
-            <a:r>
-              <a:rPr lang="es-ES" dirty="0" smtClean="0"/>
-              <a:t>Futuras</a:t>
+              <a:t>Futuras Mejoras</a:t>
             </a:r>
             <a:endParaRPr lang="es-AR" dirty="0" smtClean="0"/>
           </a:p>
@@ -4939,23 +5139,7 @@
           <a:p>
             <a:r>
               <a:rPr lang="es-AR" dirty="0" smtClean="0"/>
-              <a:t>Desarrollar </a:t>
-            </a:r>
-            <a:r>
-              <a:rPr lang="es-AR" dirty="0" smtClean="0"/>
-              <a:t>una </a:t>
-            </a:r>
-            <a:r>
-              <a:rPr lang="es-AR" dirty="0" smtClean="0"/>
-              <a:t>red social </a:t>
-            </a:r>
-            <a:r>
-              <a:rPr lang="es-AR" dirty="0" smtClean="0"/>
-              <a:t>de </a:t>
-            </a:r>
-            <a:r>
-              <a:rPr lang="es-AR" dirty="0" smtClean="0"/>
-              <a:t>eventos deportivos integrada a </a:t>
+              <a:t>Desarrollar una red social de eventos deportivos integrada a </a:t>
             </a:r>
             <a:r>
               <a:rPr lang="es-AR" dirty="0" err="1" smtClean="0"/>
@@ -5047,15 +5231,7 @@
           <a:p>
             <a:r>
               <a:rPr lang="es-AR" dirty="0" smtClean="0"/>
-              <a:t>Información </a:t>
-            </a:r>
-            <a:r>
-              <a:rPr lang="es-AR" dirty="0" smtClean="0"/>
-              <a:t>sobre deportistas, </a:t>
-            </a:r>
-            <a:r>
-              <a:rPr lang="es-AR" dirty="0" smtClean="0"/>
-              <a:t>establecimientos y equipos.</a:t>
+              <a:t>Información sobre deportistas, establecimientos y equipos.</a:t>
             </a:r>
           </a:p>
           <a:p>
@@ -5063,7 +5239,6 @@
               <a:rPr lang="es-AR" dirty="0" smtClean="0"/>
               <a:t>Organización de eventos deportivos.</a:t>
             </a:r>
-            <a:endParaRPr lang="es-AR" dirty="0" smtClean="0"/>
           </a:p>
           <a:p>
             <a:r>
@@ -5840,7 +6015,9 @@
         </p:nvSpPr>
         <p:spPr/>
         <p:txBody>
-          <a:bodyPr/>
+          <a:bodyPr>
+            <a:normAutofit fontScale="90000"/>
+          </a:bodyPr>
           <a:lstStyle/>
           <a:p>
             <a:r>
@@ -5851,6 +6028,696 @@
           </a:p>
         </p:txBody>
       </p:sp>
+      <p:sp>
+        <p:nvSpPr>
+          <p:cNvPr id="6" name="Rounded Rectangle 5"/>
+          <p:cNvSpPr/>
+          <p:nvPr/>
+        </p:nvSpPr>
+        <p:spPr>
+          <a:xfrm>
+            <a:off x="2643174" y="2786058"/>
+            <a:ext cx="1214446" cy="914400"/>
+          </a:xfrm>
+          <a:prstGeom prst="roundRect">
+            <a:avLst/>
+          </a:prstGeom>
+        </p:spPr>
+        <p:style>
+          <a:lnRef idx="2">
+            <a:schemeClr val="accent1">
+              <a:shade val="50000"/>
+            </a:schemeClr>
+          </a:lnRef>
+          <a:fillRef idx="1">
+            <a:schemeClr val="accent1"/>
+          </a:fillRef>
+          <a:effectRef idx="0">
+            <a:schemeClr val="accent1"/>
+          </a:effectRef>
+          <a:fontRef idx="minor">
+            <a:schemeClr val="lt1"/>
+          </a:fontRef>
+        </p:style>
+        <p:txBody>
+          <a:bodyPr rtlCol="0" anchor="ctr"/>
+          <a:lstStyle/>
+          <a:p>
+            <a:pPr algn="ctr"/>
+            <a:r>
+              <a:rPr lang="es-ES" dirty="0" smtClean="0"/>
+              <a:t>Jugador</a:t>
+            </a:r>
+            <a:endParaRPr lang="es-ES" dirty="0"/>
+          </a:p>
+        </p:txBody>
+      </p:sp>
+      <p:sp>
+        <p:nvSpPr>
+          <p:cNvPr id="7" name="Rounded Rectangle 6"/>
+          <p:cNvSpPr/>
+          <p:nvPr/>
+        </p:nvSpPr>
+        <p:spPr>
+          <a:xfrm>
+            <a:off x="4572000" y="2786058"/>
+            <a:ext cx="1057276" cy="914400"/>
+          </a:xfrm>
+          <a:prstGeom prst="roundRect">
+            <a:avLst/>
+          </a:prstGeom>
+        </p:spPr>
+        <p:style>
+          <a:lnRef idx="2">
+            <a:schemeClr val="accent1">
+              <a:shade val="50000"/>
+            </a:schemeClr>
+          </a:lnRef>
+          <a:fillRef idx="1">
+            <a:schemeClr val="accent1"/>
+          </a:fillRef>
+          <a:effectRef idx="0">
+            <a:schemeClr val="accent1"/>
+          </a:effectRef>
+          <a:fontRef idx="minor">
+            <a:schemeClr val="lt1"/>
+          </a:fontRef>
+        </p:style>
+        <p:txBody>
+          <a:bodyPr rtlCol="0" anchor="ctr"/>
+          <a:lstStyle/>
+          <a:p>
+            <a:pPr algn="ctr"/>
+            <a:r>
+              <a:rPr lang="es-ES" dirty="0" smtClean="0"/>
+              <a:t>Equipo</a:t>
+            </a:r>
+            <a:endParaRPr lang="es-ES" dirty="0"/>
+          </a:p>
+        </p:txBody>
+      </p:sp>
+      <p:sp>
+        <p:nvSpPr>
+          <p:cNvPr id="8" name="Diamond 7"/>
+          <p:cNvSpPr/>
+          <p:nvPr/>
+        </p:nvSpPr>
+        <p:spPr>
+          <a:xfrm>
+            <a:off x="4357686" y="3071810"/>
+            <a:ext cx="214314" cy="342896"/>
+          </a:xfrm>
+          <a:prstGeom prst="diamond">
+            <a:avLst/>
+          </a:prstGeom>
+        </p:spPr>
+        <p:style>
+          <a:lnRef idx="2">
+            <a:schemeClr val="accent1">
+              <a:shade val="50000"/>
+            </a:schemeClr>
+          </a:lnRef>
+          <a:fillRef idx="1">
+            <a:schemeClr val="accent1"/>
+          </a:fillRef>
+          <a:effectRef idx="0">
+            <a:schemeClr val="accent1"/>
+          </a:effectRef>
+          <a:fontRef idx="minor">
+            <a:schemeClr val="lt1"/>
+          </a:fontRef>
+        </p:style>
+        <p:txBody>
+          <a:bodyPr rtlCol="0" anchor="ctr"/>
+          <a:lstStyle/>
+          <a:p>
+            <a:pPr algn="ctr"/>
+            <a:endParaRPr lang="es-ES"/>
+          </a:p>
+        </p:txBody>
+      </p:sp>
+      <p:cxnSp>
+        <p:nvCxnSpPr>
+          <p:cNvPr id="10" name="Straight Connector 9"/>
+          <p:cNvCxnSpPr>
+            <a:stCxn id="8" idx="1"/>
+            <a:endCxn id="6" idx="3"/>
+          </p:cNvCxnSpPr>
+          <p:nvPr/>
+        </p:nvCxnSpPr>
+        <p:spPr>
+          <a:xfrm rot="10800000">
+            <a:off x="3857620" y="3243258"/>
+            <a:ext cx="500066" cy="1588"/>
+          </a:xfrm>
+          <a:prstGeom prst="line">
+            <a:avLst/>
+          </a:prstGeom>
+          <a:ln w="19050"/>
+        </p:spPr>
+        <p:style>
+          <a:lnRef idx="1">
+            <a:schemeClr val="accent1"/>
+          </a:lnRef>
+          <a:fillRef idx="0">
+            <a:schemeClr val="accent1"/>
+          </a:fillRef>
+          <a:effectRef idx="0">
+            <a:schemeClr val="accent1"/>
+          </a:effectRef>
+          <a:fontRef idx="minor">
+            <a:schemeClr val="tx1"/>
+          </a:fontRef>
+        </p:style>
+      </p:cxnSp>
+      <p:sp>
+        <p:nvSpPr>
+          <p:cNvPr id="12" name="Rounded Rectangle 11"/>
+          <p:cNvSpPr/>
+          <p:nvPr/>
+        </p:nvSpPr>
+        <p:spPr>
+          <a:xfrm>
+            <a:off x="4572000" y="4429132"/>
+            <a:ext cx="1000132" cy="914400"/>
+          </a:xfrm>
+          <a:prstGeom prst="roundRect">
+            <a:avLst/>
+          </a:prstGeom>
+        </p:spPr>
+        <p:style>
+          <a:lnRef idx="2">
+            <a:schemeClr val="accent1">
+              <a:shade val="50000"/>
+            </a:schemeClr>
+          </a:lnRef>
+          <a:fillRef idx="1">
+            <a:schemeClr val="accent1"/>
+          </a:fillRef>
+          <a:effectRef idx="0">
+            <a:schemeClr val="accent1"/>
+          </a:effectRef>
+          <a:fontRef idx="minor">
+            <a:schemeClr val="lt1"/>
+          </a:fontRef>
+        </p:style>
+        <p:txBody>
+          <a:bodyPr rtlCol="0" anchor="ctr"/>
+          <a:lstStyle/>
+          <a:p>
+            <a:pPr algn="ctr"/>
+            <a:r>
+              <a:rPr lang="es-ES" dirty="0" smtClean="0"/>
+              <a:t>Partido</a:t>
+            </a:r>
+            <a:endParaRPr lang="es-ES" dirty="0"/>
+          </a:p>
+        </p:txBody>
+      </p:sp>
+      <p:sp>
+        <p:nvSpPr>
+          <p:cNvPr id="13" name="Diamond 12"/>
+          <p:cNvSpPr/>
+          <p:nvPr/>
+        </p:nvSpPr>
+        <p:spPr>
+          <a:xfrm>
+            <a:off x="5000628" y="4143380"/>
+            <a:ext cx="214314" cy="271458"/>
+          </a:xfrm>
+          <a:prstGeom prst="diamond">
+            <a:avLst/>
+          </a:prstGeom>
+        </p:spPr>
+        <p:style>
+          <a:lnRef idx="2">
+            <a:schemeClr val="accent1">
+              <a:shade val="50000"/>
+            </a:schemeClr>
+          </a:lnRef>
+          <a:fillRef idx="1">
+            <a:schemeClr val="accent1"/>
+          </a:fillRef>
+          <a:effectRef idx="0">
+            <a:schemeClr val="accent1"/>
+          </a:effectRef>
+          <a:fontRef idx="minor">
+            <a:schemeClr val="lt1"/>
+          </a:fontRef>
+        </p:style>
+        <p:txBody>
+          <a:bodyPr rtlCol="0" anchor="ctr"/>
+          <a:lstStyle/>
+          <a:p>
+            <a:pPr algn="ctr"/>
+            <a:endParaRPr lang="es-ES"/>
+          </a:p>
+        </p:txBody>
+      </p:sp>
+      <p:cxnSp>
+        <p:nvCxnSpPr>
+          <p:cNvPr id="14" name="Straight Connector 13"/>
+          <p:cNvCxnSpPr>
+            <a:stCxn id="13" idx="0"/>
+            <a:endCxn id="7" idx="2"/>
+          </p:cNvCxnSpPr>
+          <p:nvPr/>
+        </p:nvCxnSpPr>
+        <p:spPr>
+          <a:xfrm rot="16200000" flipV="1">
+            <a:off x="4882751" y="3918345"/>
+            <a:ext cx="442922" cy="7147"/>
+          </a:xfrm>
+          <a:prstGeom prst="line">
+            <a:avLst/>
+          </a:prstGeom>
+          <a:ln w="19050"/>
+        </p:spPr>
+        <p:style>
+          <a:lnRef idx="1">
+            <a:schemeClr val="accent1"/>
+          </a:lnRef>
+          <a:fillRef idx="0">
+            <a:schemeClr val="accent1"/>
+          </a:fillRef>
+          <a:effectRef idx="0">
+            <a:schemeClr val="accent1"/>
+          </a:effectRef>
+          <a:fontRef idx="minor">
+            <a:schemeClr val="tx1"/>
+          </a:fontRef>
+        </p:style>
+      </p:cxnSp>
+      <p:sp>
+        <p:nvSpPr>
+          <p:cNvPr id="18" name="Rounded Rectangle 17"/>
+          <p:cNvSpPr/>
+          <p:nvPr/>
+        </p:nvSpPr>
+        <p:spPr>
+          <a:xfrm>
+            <a:off x="6215074" y="4429132"/>
+            <a:ext cx="2000264" cy="914400"/>
+          </a:xfrm>
+          <a:prstGeom prst="roundRect">
+            <a:avLst/>
+          </a:prstGeom>
+        </p:spPr>
+        <p:style>
+          <a:lnRef idx="2">
+            <a:schemeClr val="accent1">
+              <a:shade val="50000"/>
+            </a:schemeClr>
+          </a:lnRef>
+          <a:fillRef idx="1">
+            <a:schemeClr val="accent1"/>
+          </a:fillRef>
+          <a:effectRef idx="0">
+            <a:schemeClr val="accent1"/>
+          </a:effectRef>
+          <a:fontRef idx="minor">
+            <a:schemeClr val="lt1"/>
+          </a:fontRef>
+        </p:style>
+        <p:txBody>
+          <a:bodyPr rtlCol="0" anchor="ctr"/>
+          <a:lstStyle/>
+          <a:p>
+            <a:pPr algn="ctr"/>
+            <a:r>
+              <a:rPr lang="es-ES" dirty="0" smtClean="0"/>
+              <a:t>Establecimiento</a:t>
+            </a:r>
+            <a:endParaRPr lang="es-ES" dirty="0"/>
+          </a:p>
+        </p:txBody>
+      </p:sp>
+      <p:sp>
+        <p:nvSpPr>
+          <p:cNvPr id="22" name="Rounded Rectangle 21"/>
+          <p:cNvSpPr/>
+          <p:nvPr/>
+        </p:nvSpPr>
+        <p:spPr>
+          <a:xfrm>
+            <a:off x="2643174" y="4429132"/>
+            <a:ext cx="1285884" cy="914400"/>
+          </a:xfrm>
+          <a:prstGeom prst="roundRect">
+            <a:avLst/>
+          </a:prstGeom>
+        </p:spPr>
+        <p:style>
+          <a:lnRef idx="2">
+            <a:schemeClr val="accent1">
+              <a:shade val="50000"/>
+            </a:schemeClr>
+          </a:lnRef>
+          <a:fillRef idx="1">
+            <a:schemeClr val="accent1"/>
+          </a:fillRef>
+          <a:effectRef idx="0">
+            <a:schemeClr val="accent1"/>
+          </a:effectRef>
+          <a:fontRef idx="minor">
+            <a:schemeClr val="lt1"/>
+          </a:fontRef>
+        </p:style>
+        <p:txBody>
+          <a:bodyPr rtlCol="0" anchor="ctr"/>
+          <a:lstStyle/>
+          <a:p>
+            <a:pPr algn="ctr"/>
+            <a:r>
+              <a:rPr lang="es-ES" dirty="0" smtClean="0"/>
+              <a:t>Deporte</a:t>
+            </a:r>
+            <a:endParaRPr lang="es-ES" dirty="0"/>
+          </a:p>
+        </p:txBody>
+      </p:sp>
+      <p:sp>
+        <p:nvSpPr>
+          <p:cNvPr id="51" name="Rounded Rectangle 50"/>
+          <p:cNvSpPr/>
+          <p:nvPr/>
+        </p:nvSpPr>
+        <p:spPr>
+          <a:xfrm>
+            <a:off x="428628" y="2786058"/>
+            <a:ext cx="1214446" cy="914400"/>
+          </a:xfrm>
+          <a:prstGeom prst="roundRect">
+            <a:avLst/>
+          </a:prstGeom>
+        </p:spPr>
+        <p:style>
+          <a:lnRef idx="2">
+            <a:schemeClr val="accent1">
+              <a:shade val="50000"/>
+            </a:schemeClr>
+          </a:lnRef>
+          <a:fillRef idx="1">
+            <a:schemeClr val="accent1"/>
+          </a:fillRef>
+          <a:effectRef idx="0">
+            <a:schemeClr val="accent1"/>
+          </a:effectRef>
+          <a:fontRef idx="minor">
+            <a:schemeClr val="lt1"/>
+          </a:fontRef>
+        </p:style>
+        <p:txBody>
+          <a:bodyPr rtlCol="0" anchor="ctr"/>
+          <a:lstStyle/>
+          <a:p>
+            <a:pPr algn="ctr"/>
+            <a:r>
+              <a:rPr lang="es-ES" dirty="0" smtClean="0"/>
+              <a:t>Usuario</a:t>
+            </a:r>
+            <a:endParaRPr lang="es-ES" dirty="0"/>
+          </a:p>
+        </p:txBody>
+      </p:sp>
+      <p:cxnSp>
+        <p:nvCxnSpPr>
+          <p:cNvPr id="70" name="Straight Connector 69"/>
+          <p:cNvCxnSpPr>
+            <a:stCxn id="6" idx="1"/>
+            <a:endCxn id="51" idx="3"/>
+          </p:cNvCxnSpPr>
+          <p:nvPr/>
+        </p:nvCxnSpPr>
+        <p:spPr>
+          <a:xfrm rot="10800000">
+            <a:off x="1643074" y="3243258"/>
+            <a:ext cx="1000100" cy="1588"/>
+          </a:xfrm>
+          <a:prstGeom prst="line">
+            <a:avLst/>
+          </a:prstGeom>
+          <a:ln w="28575"/>
+        </p:spPr>
+        <p:style>
+          <a:lnRef idx="1">
+            <a:schemeClr val="accent1"/>
+          </a:lnRef>
+          <a:fillRef idx="0">
+            <a:schemeClr val="accent1"/>
+          </a:fillRef>
+          <a:effectRef idx="0">
+            <a:schemeClr val="accent1"/>
+          </a:effectRef>
+          <a:fontRef idx="minor">
+            <a:schemeClr val="tx1"/>
+          </a:fontRef>
+        </p:style>
+      </p:cxnSp>
+      <p:sp>
+        <p:nvSpPr>
+          <p:cNvPr id="76" name="Rounded Rectangle 75"/>
+          <p:cNvSpPr/>
+          <p:nvPr/>
+        </p:nvSpPr>
+        <p:spPr>
+          <a:xfrm>
+            <a:off x="428628" y="4429132"/>
+            <a:ext cx="1500198" cy="914400"/>
+          </a:xfrm>
+          <a:prstGeom prst="roundRect">
+            <a:avLst/>
+          </a:prstGeom>
+        </p:spPr>
+        <p:style>
+          <a:lnRef idx="2">
+            <a:schemeClr val="accent1">
+              <a:shade val="50000"/>
+            </a:schemeClr>
+          </a:lnRef>
+          <a:fillRef idx="1">
+            <a:schemeClr val="accent1"/>
+          </a:fillRef>
+          <a:effectRef idx="0">
+            <a:schemeClr val="accent1"/>
+          </a:effectRef>
+          <a:fontRef idx="minor">
+            <a:schemeClr val="lt1"/>
+          </a:fontRef>
+        </p:style>
+        <p:txBody>
+          <a:bodyPr rtlCol="0" anchor="ctr"/>
+          <a:lstStyle/>
+          <a:p>
+            <a:pPr algn="ctr"/>
+            <a:r>
+              <a:rPr lang="es-ES" dirty="0" err="1" smtClean="0"/>
+              <a:t>Puntuacion</a:t>
+            </a:r>
+            <a:endParaRPr lang="es-ES" dirty="0"/>
+          </a:p>
+        </p:txBody>
+      </p:sp>
+      <p:cxnSp>
+        <p:nvCxnSpPr>
+          <p:cNvPr id="91" name="Straight Connector 90"/>
+          <p:cNvCxnSpPr>
+            <a:endCxn id="76" idx="0"/>
+          </p:cNvCxnSpPr>
+          <p:nvPr/>
+        </p:nvCxnSpPr>
+        <p:spPr>
+          <a:xfrm rot="16200000" flipH="1">
+            <a:off x="767942" y="4018347"/>
+            <a:ext cx="785818" cy="35751"/>
+          </a:xfrm>
+          <a:prstGeom prst="line">
+            <a:avLst/>
+          </a:prstGeom>
+          <a:ln w="28575"/>
+        </p:spPr>
+        <p:style>
+          <a:lnRef idx="1">
+            <a:schemeClr val="accent1"/>
+          </a:lnRef>
+          <a:fillRef idx="0">
+            <a:schemeClr val="accent1"/>
+          </a:fillRef>
+          <a:effectRef idx="0">
+            <a:schemeClr val="accent1"/>
+          </a:effectRef>
+          <a:fontRef idx="minor">
+            <a:schemeClr val="tx1"/>
+          </a:fontRef>
+        </p:style>
+      </p:cxnSp>
+      <p:cxnSp>
+        <p:nvCxnSpPr>
+          <p:cNvPr id="93" name="Straight Connector 92"/>
+          <p:cNvCxnSpPr/>
+          <p:nvPr/>
+        </p:nvCxnSpPr>
+        <p:spPr>
+          <a:xfrm rot="10800000" flipV="1">
+            <a:off x="1821670" y="3643315"/>
+            <a:ext cx="892945" cy="857255"/>
+          </a:xfrm>
+          <a:prstGeom prst="line">
+            <a:avLst/>
+          </a:prstGeom>
+          <a:ln w="28575"/>
+        </p:spPr>
+        <p:style>
+          <a:lnRef idx="1">
+            <a:schemeClr val="accent1"/>
+          </a:lnRef>
+          <a:fillRef idx="0">
+            <a:schemeClr val="accent1"/>
+          </a:fillRef>
+          <a:effectRef idx="0">
+            <a:schemeClr val="accent1"/>
+          </a:effectRef>
+          <a:fontRef idx="minor">
+            <a:schemeClr val="tx1"/>
+          </a:fontRef>
+        </p:style>
+      </p:cxnSp>
+      <p:cxnSp>
+        <p:nvCxnSpPr>
+          <p:cNvPr id="95" name="Straight Connector 94"/>
+          <p:cNvCxnSpPr>
+            <a:stCxn id="22" idx="1"/>
+            <a:endCxn id="76" idx="3"/>
+          </p:cNvCxnSpPr>
+          <p:nvPr/>
+        </p:nvCxnSpPr>
+        <p:spPr>
+          <a:xfrm rot="10800000">
+            <a:off x="1928826" y="4886332"/>
+            <a:ext cx="714348" cy="1588"/>
+          </a:xfrm>
+          <a:prstGeom prst="line">
+            <a:avLst/>
+          </a:prstGeom>
+          <a:ln w="28575"/>
+        </p:spPr>
+        <p:style>
+          <a:lnRef idx="1">
+            <a:schemeClr val="accent1"/>
+          </a:lnRef>
+          <a:fillRef idx="0">
+            <a:schemeClr val="accent1"/>
+          </a:fillRef>
+          <a:effectRef idx="0">
+            <a:schemeClr val="accent1"/>
+          </a:effectRef>
+          <a:fontRef idx="minor">
+            <a:schemeClr val="tx1"/>
+          </a:fontRef>
+        </p:style>
+      </p:cxnSp>
+      <p:cxnSp>
+        <p:nvCxnSpPr>
+          <p:cNvPr id="107" name="Straight Connector 106"/>
+          <p:cNvCxnSpPr>
+            <a:stCxn id="12" idx="1"/>
+            <a:endCxn id="22" idx="3"/>
+          </p:cNvCxnSpPr>
+          <p:nvPr/>
+        </p:nvCxnSpPr>
+        <p:spPr>
+          <a:xfrm rot="10800000">
+            <a:off x="3929058" y="4886332"/>
+            <a:ext cx="642942" cy="1588"/>
+          </a:xfrm>
+          <a:prstGeom prst="line">
+            <a:avLst/>
+          </a:prstGeom>
+          <a:ln w="28575"/>
+        </p:spPr>
+        <p:style>
+          <a:lnRef idx="1">
+            <a:schemeClr val="accent1"/>
+          </a:lnRef>
+          <a:fillRef idx="0">
+            <a:schemeClr val="accent1"/>
+          </a:fillRef>
+          <a:effectRef idx="0">
+            <a:schemeClr val="accent1"/>
+          </a:effectRef>
+          <a:fontRef idx="minor">
+            <a:schemeClr val="tx1"/>
+          </a:fontRef>
+        </p:style>
+      </p:cxnSp>
+      <p:cxnSp>
+        <p:nvCxnSpPr>
+          <p:cNvPr id="110" name="Straight Connector 109"/>
+          <p:cNvCxnSpPr>
+            <a:stCxn id="18" idx="1"/>
+            <a:endCxn id="12" idx="3"/>
+          </p:cNvCxnSpPr>
+          <p:nvPr/>
+        </p:nvCxnSpPr>
+        <p:spPr>
+          <a:xfrm rot="10800000">
+            <a:off x="5572132" y="4886332"/>
+            <a:ext cx="642942" cy="1588"/>
+          </a:xfrm>
+          <a:prstGeom prst="line">
+            <a:avLst/>
+          </a:prstGeom>
+          <a:ln w="28575"/>
+        </p:spPr>
+        <p:style>
+          <a:lnRef idx="1">
+            <a:schemeClr val="accent1"/>
+          </a:lnRef>
+          <a:fillRef idx="0">
+            <a:schemeClr val="accent1"/>
+          </a:fillRef>
+          <a:effectRef idx="0">
+            <a:schemeClr val="accent1"/>
+          </a:effectRef>
+          <a:fontRef idx="minor">
+            <a:schemeClr val="tx1"/>
+          </a:fontRef>
+        </p:style>
+      </p:cxnSp>
+      <p:cxnSp>
+        <p:nvCxnSpPr>
+          <p:cNvPr id="113" name="Straight Connector 112"/>
+          <p:cNvCxnSpPr>
+            <a:stCxn id="22" idx="0"/>
+            <a:endCxn id="6" idx="2"/>
+          </p:cNvCxnSpPr>
+          <p:nvPr/>
+        </p:nvCxnSpPr>
+        <p:spPr>
+          <a:xfrm rot="16200000" flipV="1">
+            <a:off x="2903920" y="4046935"/>
+            <a:ext cx="728674" cy="35719"/>
+          </a:xfrm>
+          <a:prstGeom prst="line">
+            <a:avLst/>
+          </a:prstGeom>
+          <a:ln w="28575"/>
+        </p:spPr>
+        <p:style>
+          <a:lnRef idx="1">
+            <a:schemeClr val="accent1"/>
+          </a:lnRef>
+          <a:fillRef idx="0">
+            <a:schemeClr val="accent1"/>
+          </a:fillRef>
+          <a:effectRef idx="0">
+            <a:schemeClr val="accent1"/>
+          </a:effectRef>
+          <a:fontRef idx="minor">
+            <a:schemeClr val="tx1"/>
+          </a:fontRef>
+        </p:style>
+      </p:cxnSp>
     </p:spTree>
   </p:cSld>
   <p:clrMapOvr>

</xml_diff>